<commit_message>
Addressed formatting issue w/ FB Share and added specs for feeding an alternative image in the event the original image is destroyed.
</commit_message>
<xml_diff>
--- a/public/the_bomb.pptx
+++ b/public/the_bomb.pptx
@@ -288,6 +288,7 @@
           <a:p>
             <a:fld id="{32348531-9D62-3E49-80B9-217C60AC299C}" type="datetimeFigureOut">
               <a:rPr lang="en-US" smtClean="0"/>
+              <a:pPr/>
               <a:t>2/3/14</a:t>
             </a:fld>
             <a:endParaRPr lang="en-US"/>
@@ -330,6 +331,7 @@
           <a:p>
             <a:fld id="{309D3342-D48D-884F-B9A9-0B7C7A64CFA3}" type="slidenum">
               <a:rPr lang="en-US" smtClean="0"/>
+              <a:pPr/>
               <a:t>‹#›</a:t>
             </a:fld>
             <a:endParaRPr lang="en-US"/>
@@ -453,6 +455,7 @@
           <a:p>
             <a:fld id="{32348531-9D62-3E49-80B9-217C60AC299C}" type="datetimeFigureOut">
               <a:rPr lang="en-US" smtClean="0"/>
+              <a:pPr/>
               <a:t>2/3/14</a:t>
             </a:fld>
             <a:endParaRPr lang="en-US"/>
@@ -495,6 +498,7 @@
           <a:p>
             <a:fld id="{309D3342-D48D-884F-B9A9-0B7C7A64CFA3}" type="slidenum">
               <a:rPr lang="en-US" smtClean="0"/>
+              <a:pPr/>
               <a:t>‹#›</a:t>
             </a:fld>
             <a:endParaRPr lang="en-US"/>
@@ -628,6 +632,7 @@
           <a:p>
             <a:fld id="{32348531-9D62-3E49-80B9-217C60AC299C}" type="datetimeFigureOut">
               <a:rPr lang="en-US" smtClean="0"/>
+              <a:pPr/>
               <a:t>2/3/14</a:t>
             </a:fld>
             <a:endParaRPr lang="en-US"/>
@@ -670,6 +675,7 @@
           <a:p>
             <a:fld id="{309D3342-D48D-884F-B9A9-0B7C7A64CFA3}" type="slidenum">
               <a:rPr lang="en-US" smtClean="0"/>
+              <a:pPr/>
               <a:t>‹#›</a:t>
             </a:fld>
             <a:endParaRPr lang="en-US"/>
@@ -793,6 +799,7 @@
           <a:p>
             <a:fld id="{32348531-9D62-3E49-80B9-217C60AC299C}" type="datetimeFigureOut">
               <a:rPr lang="en-US" smtClean="0"/>
+              <a:pPr/>
               <a:t>2/3/14</a:t>
             </a:fld>
             <a:endParaRPr lang="en-US"/>
@@ -835,6 +842,7 @@
           <a:p>
             <a:fld id="{309D3342-D48D-884F-B9A9-0B7C7A64CFA3}" type="slidenum">
               <a:rPr lang="en-US" smtClean="0"/>
+              <a:pPr/>
               <a:t>‹#›</a:t>
             </a:fld>
             <a:endParaRPr lang="en-US"/>
@@ -1034,6 +1042,7 @@
           <a:p>
             <a:fld id="{32348531-9D62-3E49-80B9-217C60AC299C}" type="datetimeFigureOut">
               <a:rPr lang="en-US" smtClean="0"/>
+              <a:pPr/>
               <a:t>2/3/14</a:t>
             </a:fld>
             <a:endParaRPr lang="en-US"/>
@@ -1076,6 +1085,7 @@
           <a:p>
             <a:fld id="{309D3342-D48D-884F-B9A9-0B7C7A64CFA3}" type="slidenum">
               <a:rPr lang="en-US" smtClean="0"/>
+              <a:pPr/>
               <a:t>‹#›</a:t>
             </a:fld>
             <a:endParaRPr lang="en-US"/>
@@ -1317,6 +1327,7 @@
           <a:p>
             <a:fld id="{32348531-9D62-3E49-80B9-217C60AC299C}" type="datetimeFigureOut">
               <a:rPr lang="en-US" smtClean="0"/>
+              <a:pPr/>
               <a:t>2/3/14</a:t>
             </a:fld>
             <a:endParaRPr lang="en-US"/>
@@ -1359,6 +1370,7 @@
           <a:p>
             <a:fld id="{309D3342-D48D-884F-B9A9-0B7C7A64CFA3}" type="slidenum">
               <a:rPr lang="en-US" smtClean="0"/>
+              <a:pPr/>
               <a:t>‹#›</a:t>
             </a:fld>
             <a:endParaRPr lang="en-US"/>
@@ -1734,6 +1746,7 @@
           <a:p>
             <a:fld id="{32348531-9D62-3E49-80B9-217C60AC299C}" type="datetimeFigureOut">
               <a:rPr lang="en-US" smtClean="0"/>
+              <a:pPr/>
               <a:t>2/3/14</a:t>
             </a:fld>
             <a:endParaRPr lang="en-US"/>
@@ -1776,6 +1789,7 @@
           <a:p>
             <a:fld id="{309D3342-D48D-884F-B9A9-0B7C7A64CFA3}" type="slidenum">
               <a:rPr lang="en-US" smtClean="0"/>
+              <a:pPr/>
               <a:t>‹#›</a:t>
             </a:fld>
             <a:endParaRPr lang="en-US"/>
@@ -1847,6 +1861,7 @@
           <a:p>
             <a:fld id="{32348531-9D62-3E49-80B9-217C60AC299C}" type="datetimeFigureOut">
               <a:rPr lang="en-US" smtClean="0"/>
+              <a:pPr/>
               <a:t>2/3/14</a:t>
             </a:fld>
             <a:endParaRPr lang="en-US"/>
@@ -1889,6 +1904,7 @@
           <a:p>
             <a:fld id="{309D3342-D48D-884F-B9A9-0B7C7A64CFA3}" type="slidenum">
               <a:rPr lang="en-US" smtClean="0"/>
+              <a:pPr/>
               <a:t>‹#›</a:t>
             </a:fld>
             <a:endParaRPr lang="en-US"/>
@@ -1937,6 +1953,7 @@
           <a:p>
             <a:fld id="{32348531-9D62-3E49-80B9-217C60AC299C}" type="datetimeFigureOut">
               <a:rPr lang="en-US" smtClean="0"/>
+              <a:pPr/>
               <a:t>2/3/14</a:t>
             </a:fld>
             <a:endParaRPr lang="en-US"/>
@@ -1979,6 +1996,7 @@
           <a:p>
             <a:fld id="{309D3342-D48D-884F-B9A9-0B7C7A64CFA3}" type="slidenum">
               <a:rPr lang="en-US" smtClean="0"/>
+              <a:pPr/>
               <a:t>‹#›</a:t>
             </a:fld>
             <a:endParaRPr lang="en-US"/>
@@ -2209,6 +2227,7 @@
           <a:p>
             <a:fld id="{32348531-9D62-3E49-80B9-217C60AC299C}" type="datetimeFigureOut">
               <a:rPr lang="en-US" smtClean="0"/>
+              <a:pPr/>
               <a:t>2/3/14</a:t>
             </a:fld>
             <a:endParaRPr lang="en-US"/>
@@ -2251,6 +2270,7 @@
           <a:p>
             <a:fld id="{309D3342-D48D-884F-B9A9-0B7C7A64CFA3}" type="slidenum">
               <a:rPr lang="en-US" smtClean="0"/>
+              <a:pPr/>
               <a:t>‹#›</a:t>
             </a:fld>
             <a:endParaRPr lang="en-US"/>
@@ -2457,6 +2477,7 @@
           <a:p>
             <a:fld id="{32348531-9D62-3E49-80B9-217C60AC299C}" type="datetimeFigureOut">
               <a:rPr lang="en-US" smtClean="0"/>
+              <a:pPr/>
               <a:t>2/3/14</a:t>
             </a:fld>
             <a:endParaRPr lang="en-US"/>
@@ -2499,6 +2520,7 @@
           <a:p>
             <a:fld id="{309D3342-D48D-884F-B9A9-0B7C7A64CFA3}" type="slidenum">
               <a:rPr lang="en-US" smtClean="0"/>
+              <a:pPr/>
               <a:t>‹#›</a:t>
             </a:fld>
             <a:endParaRPr lang="en-US"/>
@@ -2665,6 +2687,7 @@
           <a:p>
             <a:fld id="{32348531-9D62-3E49-80B9-217C60AC299C}" type="datetimeFigureOut">
               <a:rPr lang="en-US" smtClean="0"/>
+              <a:pPr/>
               <a:t>2/3/14</a:t>
             </a:fld>
             <a:endParaRPr lang="en-US"/>
@@ -2743,6 +2766,7 @@
           <a:p>
             <a:fld id="{309D3342-D48D-884F-B9A9-0B7C7A64CFA3}" type="slidenum">
               <a:rPr lang="en-US" smtClean="0"/>
+              <a:pPr/>
               <a:t>‹#›</a:t>
             </a:fld>
             <a:endParaRPr lang="en-US"/>
@@ -3021,6 +3045,14 @@
 <file path=ppt/slides/slide1.xml><?xml version="1.0" encoding="utf-8"?>
 <p:sld xmlns:a="http://schemas.openxmlformats.org/drawingml/2006/main" xmlns:r="http://schemas.openxmlformats.org/officeDocument/2006/relationships" xmlns:mc="http://schemas.openxmlformats.org/markup-compatibility/2006" xmlns:mv="urn:schemas-microsoft-com:mac:vml" xmlns:p="http://schemas.openxmlformats.org/presentationml/2006/main" mc:Ignorable="mv" mc:PreserveAttributes="mv:*">
   <p:cSld>
+    <p:bg>
+      <p:bgPr>
+        <a:solidFill>
+          <a:schemeClr val="accent6"/>
+        </a:solidFill>
+        <a:effectLst/>
+      </p:bgPr>
+    </p:bg>
     <p:spTree>
       <p:nvGrpSpPr>
         <p:cNvPr id="1" name=""/>
@@ -3037,16 +3069,16 @@
       </p:grpSpPr>
       <p:grpSp>
         <p:nvGrpSpPr>
-          <p:cNvPr id="6" name="Group 5"/>
+          <p:cNvPr id="14" name="Group 13"/>
           <p:cNvGrpSpPr/>
           <p:nvPr/>
         </p:nvGrpSpPr>
         <p:grpSpPr>
           <a:xfrm>
-            <a:off x="1736283" y="2886511"/>
-            <a:ext cx="2908556" cy="2817995"/>
-            <a:chOff x="1736283" y="2886511"/>
-            <a:chExt cx="2908556" cy="2817995"/>
+            <a:off x="1897188" y="1632599"/>
+            <a:ext cx="2627780" cy="1894665"/>
+            <a:chOff x="1897188" y="1632599"/>
+            <a:chExt cx="2627780" cy="1894665"/>
           </a:xfrm>
         </p:grpSpPr>
         <p:pic>
@@ -3066,12 +3098,15 @@
           </p:blipFill>
           <p:spPr>
             <a:xfrm>
-              <a:off x="1882590" y="2886511"/>
-              <a:ext cx="2627780" cy="1954427"/>
+              <a:off x="1897188" y="1632599"/>
+              <a:ext cx="2627780" cy="1894665"/>
             </a:xfrm>
             <a:prstGeom prst="rect">
               <a:avLst/>
             </a:prstGeom>
+            <a:solidFill>
+              <a:schemeClr val="bg1"/>
+            </a:solidFill>
           </p:spPr>
         </p:pic>
         <p:sp>
@@ -3082,8 +3117,8 @@
           </p:nvSpPr>
           <p:spPr>
             <a:xfrm>
-              <a:off x="1736283" y="4781176"/>
-              <a:ext cx="2908556" cy="923330"/>
+              <a:off x="1985369" y="3247106"/>
+              <a:ext cx="2422540" cy="276999"/>
             </a:xfrm>
             <a:prstGeom prst="rect">
               <a:avLst/>
@@ -3091,31 +3126,21 @@
             <a:noFill/>
           </p:spPr>
           <p:txBody>
-            <a:bodyPr wrap="none" rtlCol="0">
+            <a:bodyPr wrap="square" rtlCol="0">
               <a:spAutoFit/>
             </a:bodyPr>
             <a:lstStyle/>
             <a:p>
               <a:pPr algn="ctr"/>
               <a:r>
-                <a:rPr lang="en-US" dirty="0" smtClean="0"/>
-                <a:t>This picture was the bomb!...</a:t>
+                <a:rPr lang="en-US" sz="1200" dirty="0" smtClean="0"/>
+                <a:t>This picture</a:t>
               </a:r>
-            </a:p>
-            <a:p>
-              <a:pPr algn="ctr"/>
               <a:r>
-                <a:rPr lang="en-US" dirty="0" smtClean="0"/>
-                <a:t>But it’s been removed by the</a:t>
+                <a:rPr lang="en-US" sz="1200" dirty="0" smtClean="0"/>
+                <a:t> went bye-bye.</a:t>
               </a:r>
-            </a:p>
-            <a:p>
-              <a:pPr algn="ctr"/>
-              <a:r>
-                <a:rPr lang="en-US" dirty="0" smtClean="0"/>
-                <a:t>Person that uploaded it.</a:t>
-              </a:r>
-              <a:endParaRPr lang="en-US" dirty="0"/>
+              <a:endParaRPr lang="en-US" sz="1200" dirty="0"/>
             </a:p>
           </p:txBody>
         </p:sp>

</xml_diff>